<commit_message>
Add Trello and GitHub links in design docs
</commit_message>
<xml_diff>
--- a/Design Docs/DESIGN PROPOSAL v06.pptx
+++ b/Design Docs/DESIGN PROPOSAL v06.pptx
@@ -3854,6 +3854,78 @@
           </a:fontRef>
         </p:style>
       </p:cxnSp>
+      <p:pic>
+        <p:nvPicPr>
+          <p:cNvPr id="4" name="Picture 3" descr="A picture containing clock, drawing&#10;&#10;Description automatically generated">
+            <a:extLst>
+              <a:ext uri="{FF2B5EF4-FFF2-40B4-BE49-F238E27FC236}">
+                <a16:creationId xmlns:a16="http://schemas.microsoft.com/office/drawing/2014/main" id="{B1DB223A-FBE2-4E89-9B3C-1F3440DDF113}"/>
+              </a:ext>
+            </a:extLst>
+          </p:cNvPr>
+          <p:cNvPicPr>
+            <a:picLocks noChangeAspect="1"/>
+          </p:cNvPicPr>
+          <p:nvPr/>
+        </p:nvPicPr>
+        <p:blipFill>
+          <a:blip r:embed="rId2">
+            <a:extLst>
+              <a:ext uri="{28A0092B-C50C-407E-A947-70E740481C1C}">
+                <a14:useLocalDpi xmlns:a14="http://schemas.microsoft.com/office/drawing/2010/main" val="0"/>
+              </a:ext>
+            </a:extLst>
+          </a:blip>
+          <a:stretch>
+            <a:fillRect/>
+          </a:stretch>
+        </p:blipFill>
+        <p:spPr>
+          <a:xfrm>
+            <a:off x="3029340" y="4885133"/>
+            <a:ext cx="2369976" cy="728399"/>
+          </a:xfrm>
+          <a:prstGeom prst="rect">
+            <a:avLst/>
+          </a:prstGeom>
+        </p:spPr>
+      </p:pic>
+      <p:pic>
+        <p:nvPicPr>
+          <p:cNvPr id="6" name="Picture 5">
+            <a:extLst>
+              <a:ext uri="{FF2B5EF4-FFF2-40B4-BE49-F238E27FC236}">
+                <a16:creationId xmlns:a16="http://schemas.microsoft.com/office/drawing/2014/main" id="{E55C54B3-EF9F-4028-A404-1241E5DCA70A}"/>
+              </a:ext>
+            </a:extLst>
+          </p:cNvPr>
+          <p:cNvPicPr>
+            <a:picLocks noChangeAspect="1"/>
+          </p:cNvPicPr>
+          <p:nvPr/>
+        </p:nvPicPr>
+        <p:blipFill>
+          <a:blip r:embed="rId3">
+            <a:extLst>
+              <a:ext uri="{28A0092B-C50C-407E-A947-70E740481C1C}">
+                <a14:useLocalDpi xmlns:a14="http://schemas.microsoft.com/office/drawing/2010/main" val="0"/>
+              </a:ext>
+            </a:extLst>
+          </a:blip>
+          <a:stretch>
+            <a:fillRect/>
+          </a:stretch>
+        </p:blipFill>
+        <p:spPr>
+          <a:xfrm>
+            <a:off x="6792685" y="4350082"/>
+            <a:ext cx="1782147" cy="1481410"/>
+          </a:xfrm>
+          <a:prstGeom prst="rect">
+            <a:avLst/>
+          </a:prstGeom>
+        </p:spPr>
+      </p:pic>
     </p:spTree>
     <p:extLst>
       <p:ext uri="{BB962C8B-B14F-4D97-AF65-F5344CB8AC3E}">
@@ -6626,9 +6698,12 @@
 </file>
 
 <file path=customXml/item1.xml><?xml version="1.0" encoding="utf-8"?>
-<p:properties xmlns:p="http://schemas.microsoft.com/office/2006/metadata/properties" xmlns:xsi="http://www.w3.org/2001/XMLSchema-instance" xmlns:pc="http://schemas.microsoft.com/office/infopath/2007/PartnerControls">
-  <documentManagement/>
-</p:properties>
+<?mso-contentType ?>
+<FormTemplates xmlns="http://schemas.microsoft.com/sharepoint/v3/contenttype/forms">
+  <Display>DocumentLibraryForm</Display>
+  <Edit>DocumentLibraryForm</Edit>
+  <New>DocumentLibraryForm</New>
+</FormTemplates>
 </file>
 
 <file path=customXml/item2.xml><?xml version="1.0" encoding="utf-8"?>
@@ -6855,27 +6930,15 @@
 </file>
 
 <file path=customXml/item3.xml><?xml version="1.0" encoding="utf-8"?>
-<?mso-contentType ?>
-<FormTemplates xmlns="http://schemas.microsoft.com/sharepoint/v3/contenttype/forms">
-  <Display>DocumentLibraryForm</Display>
-  <Edit>DocumentLibraryForm</Edit>
-  <New>DocumentLibraryForm</New>
-</FormTemplates>
+<p:properties xmlns:p="http://schemas.microsoft.com/office/2006/metadata/properties" xmlns:xsi="http://www.w3.org/2001/XMLSchema-instance" xmlns:pc="http://schemas.microsoft.com/office/infopath/2007/PartnerControls">
+  <documentManagement/>
+</p:properties>
 </file>
 
 <file path=customXml/itemProps1.xml><?xml version="1.0" encoding="utf-8"?>
-<ds:datastoreItem xmlns:ds="http://schemas.openxmlformats.org/officeDocument/2006/customXml" ds:itemID="{A27989CC-B010-4497-8B13-D93D3DDFB0CB}">
+<ds:datastoreItem xmlns:ds="http://schemas.openxmlformats.org/officeDocument/2006/customXml" ds:itemID="{DA1088C9-FB11-42CD-8134-4D5282145E0F}">
   <ds:schemaRefs>
-    <ds:schemaRef ds:uri="http://www.w3.org/XML/1998/namespace"/>
-    <ds:schemaRef ds:uri="0e0e46dd-8fe2-4bdf-8e33-3e20f7420fd4"/>
-    <ds:schemaRef ds:uri="http://purl.org/dc/terms/"/>
-    <ds:schemaRef ds:uri="http://purl.org/dc/elements/1.1/"/>
-    <ds:schemaRef ds:uri="http://schemas.microsoft.com/office/2006/documentManagement/types"/>
-    <ds:schemaRef ds:uri="http://schemas.microsoft.com/office/infopath/2007/PartnerControls"/>
-    <ds:schemaRef ds:uri="213ccd01-2797-43b0-9b6c-cdde795fafff"/>
-    <ds:schemaRef ds:uri="http://schemas.openxmlformats.org/package/2006/metadata/core-properties"/>
-    <ds:schemaRef ds:uri="http://schemas.microsoft.com/office/2006/metadata/properties"/>
-    <ds:schemaRef ds:uri="http://purl.org/dc/dcmitype/"/>
+    <ds:schemaRef ds:uri="http://schemas.microsoft.com/sharepoint/v3/contenttype/forms"/>
   </ds:schemaRefs>
 </ds:datastoreItem>
 </file>
@@ -6900,9 +6963,18 @@
 </file>
 
 <file path=customXml/itemProps3.xml><?xml version="1.0" encoding="utf-8"?>
-<ds:datastoreItem xmlns:ds="http://schemas.openxmlformats.org/officeDocument/2006/customXml" ds:itemID="{DA1088C9-FB11-42CD-8134-4D5282145E0F}">
+<ds:datastoreItem xmlns:ds="http://schemas.openxmlformats.org/officeDocument/2006/customXml" ds:itemID="{A27989CC-B010-4497-8B13-D93D3DDFB0CB}">
   <ds:schemaRefs>
-    <ds:schemaRef ds:uri="http://schemas.microsoft.com/sharepoint/v3/contenttype/forms"/>
+    <ds:schemaRef ds:uri="http://www.w3.org/XML/1998/namespace"/>
+    <ds:schemaRef ds:uri="0e0e46dd-8fe2-4bdf-8e33-3e20f7420fd4"/>
+    <ds:schemaRef ds:uri="http://purl.org/dc/terms/"/>
+    <ds:schemaRef ds:uri="http://purl.org/dc/elements/1.1/"/>
+    <ds:schemaRef ds:uri="http://schemas.microsoft.com/office/2006/documentManagement/types"/>
+    <ds:schemaRef ds:uri="http://schemas.microsoft.com/office/infopath/2007/PartnerControls"/>
+    <ds:schemaRef ds:uri="213ccd01-2797-43b0-9b6c-cdde795fafff"/>
+    <ds:schemaRef ds:uri="http://schemas.openxmlformats.org/package/2006/metadata/core-properties"/>
+    <ds:schemaRef ds:uri="http://schemas.microsoft.com/office/2006/metadata/properties"/>
+    <ds:schemaRef ds:uri="http://purl.org/dc/dcmitype/"/>
   </ds:schemaRefs>
 </ds:datastoreItem>
 </file>
</xml_diff>